<commit_message>
IT raport update + presentation update
</commit_message>
<xml_diff>
--- a/text/it/Plantie™.pptx
+++ b/text/it/Plantie™.pptx
@@ -8,7 +8,9 @@
     <p:sldId id="256" r:id="rId2"/>
     <p:sldId id="257" r:id="rId3"/>
     <p:sldId id="259" r:id="rId4"/>
-    <p:sldId id="258" r:id="rId5"/>
+    <p:sldId id="260" r:id="rId5"/>
+    <p:sldId id="258" r:id="rId6"/>
+    <p:sldId id="261" r:id="rId7"/>
   </p:sldIdLst>
   <p:sldSz cx="12192000" cy="6858000"/>
   <p:notesSz cx="6858000" cy="9144000"/>
@@ -109,7 +111,7 @@
   </p:defaultTextStyle>
   <p:extLst>
     <p:ext uri="{EFAFB233-063F-42B5-8137-9DF3F51BA10A}">
-      <p15:sldGuideLst xmlns:p15="http://schemas.microsoft.com/office/powerpoint/2012/main" xmlns=""/>
+      <p15:sldGuideLst xmlns="" xmlns:p15="http://schemas.microsoft.com/office/powerpoint/2012/main"/>
     </p:ext>
   </p:extLst>
 </p:presentation>
@@ -837,7 +839,7 @@
           <a:p>
             <a:fld id="{8377D162-D88A-4FD6-BEEE-7A2BD5421321}" type="datetimeFigureOut">
               <a:rPr lang="pl-PL" smtClean="0"/>
-              <a:t>05.01.2020</a:t>
+              <a:t>07.01.2020</a:t>
             </a:fld>
             <a:endParaRPr lang="pl-PL"/>
           </a:p>
@@ -1088,7 +1090,7 @@
           <a:p>
             <a:fld id="{8377D162-D88A-4FD6-BEEE-7A2BD5421321}" type="datetimeFigureOut">
               <a:rPr lang="pl-PL" smtClean="0"/>
-              <a:t>05.01.2020</a:t>
+              <a:t>07.01.2020</a:t>
             </a:fld>
             <a:endParaRPr lang="pl-PL"/>
           </a:p>
@@ -1402,7 +1404,7 @@
           <a:p>
             <a:fld id="{8377D162-D88A-4FD6-BEEE-7A2BD5421321}" type="datetimeFigureOut">
               <a:rPr lang="pl-PL" smtClean="0"/>
-              <a:t>05.01.2020</a:t>
+              <a:t>07.01.2020</a:t>
             </a:fld>
             <a:endParaRPr lang="pl-PL"/>
           </a:p>
@@ -1743,7 +1745,7 @@
           <a:p>
             <a:fld id="{8377D162-D88A-4FD6-BEEE-7A2BD5421321}" type="datetimeFigureOut">
               <a:rPr lang="pl-PL" smtClean="0"/>
-              <a:t>05.01.2020</a:t>
+              <a:t>07.01.2020</a:t>
             </a:fld>
             <a:endParaRPr lang="pl-PL"/>
           </a:p>
@@ -2057,7 +2059,7 @@
           <a:p>
             <a:fld id="{8377D162-D88A-4FD6-BEEE-7A2BD5421321}" type="datetimeFigureOut">
               <a:rPr lang="pl-PL" smtClean="0"/>
-              <a:t>05.01.2020</a:t>
+              <a:t>07.01.2020</a:t>
             </a:fld>
             <a:endParaRPr lang="pl-PL"/>
           </a:p>
@@ -2450,7 +2452,7 @@
           <a:p>
             <a:fld id="{8377D162-D88A-4FD6-BEEE-7A2BD5421321}" type="datetimeFigureOut">
               <a:rPr lang="pl-PL" smtClean="0"/>
-              <a:t>05.01.2020</a:t>
+              <a:t>07.01.2020</a:t>
             </a:fld>
             <a:endParaRPr lang="pl-PL"/>
           </a:p>
@@ -2620,7 +2622,7 @@
           <a:p>
             <a:fld id="{8377D162-D88A-4FD6-BEEE-7A2BD5421321}" type="datetimeFigureOut">
               <a:rPr lang="pl-PL" smtClean="0"/>
-              <a:t>05.01.2020</a:t>
+              <a:t>07.01.2020</a:t>
             </a:fld>
             <a:endParaRPr lang="pl-PL"/>
           </a:p>
@@ -2800,7 +2802,7 @@
           <a:p>
             <a:fld id="{8377D162-D88A-4FD6-BEEE-7A2BD5421321}" type="datetimeFigureOut">
               <a:rPr lang="pl-PL" smtClean="0"/>
-              <a:t>05.01.2020</a:t>
+              <a:t>07.01.2020</a:t>
             </a:fld>
             <a:endParaRPr lang="pl-PL"/>
           </a:p>
@@ -2976,7 +2978,7 @@
           <a:p>
             <a:fld id="{8377D162-D88A-4FD6-BEEE-7A2BD5421321}" type="datetimeFigureOut">
               <a:rPr lang="pl-PL" smtClean="0"/>
-              <a:t>05.01.2020</a:t>
+              <a:t>07.01.2020</a:t>
             </a:fld>
             <a:endParaRPr lang="pl-PL"/>
           </a:p>
@@ -3223,7 +3225,7 @@
           <a:p>
             <a:fld id="{8377D162-D88A-4FD6-BEEE-7A2BD5421321}" type="datetimeFigureOut">
               <a:rPr lang="pl-PL" smtClean="0"/>
-              <a:t>05.01.2020</a:t>
+              <a:t>07.01.2020</a:t>
             </a:fld>
             <a:endParaRPr lang="pl-PL"/>
           </a:p>
@@ -3455,7 +3457,7 @@
           <a:p>
             <a:fld id="{8377D162-D88A-4FD6-BEEE-7A2BD5421321}" type="datetimeFigureOut">
               <a:rPr lang="pl-PL" smtClean="0"/>
-              <a:t>05.01.2020</a:t>
+              <a:t>07.01.2020</a:t>
             </a:fld>
             <a:endParaRPr lang="pl-PL"/>
           </a:p>
@@ -3829,7 +3831,7 @@
           <a:p>
             <a:fld id="{8377D162-D88A-4FD6-BEEE-7A2BD5421321}" type="datetimeFigureOut">
               <a:rPr lang="pl-PL" smtClean="0"/>
-              <a:t>05.01.2020</a:t>
+              <a:t>07.01.2020</a:t>
             </a:fld>
             <a:endParaRPr lang="pl-PL"/>
           </a:p>
@@ -3952,7 +3954,7 @@
           <a:p>
             <a:fld id="{8377D162-D88A-4FD6-BEEE-7A2BD5421321}" type="datetimeFigureOut">
               <a:rPr lang="pl-PL" smtClean="0"/>
-              <a:t>05.01.2020</a:t>
+              <a:t>07.01.2020</a:t>
             </a:fld>
             <a:endParaRPr lang="pl-PL"/>
           </a:p>
@@ -4047,7 +4049,7 @@
           <a:p>
             <a:fld id="{8377D162-D88A-4FD6-BEEE-7A2BD5421321}" type="datetimeFigureOut">
               <a:rPr lang="pl-PL" smtClean="0"/>
-              <a:t>05.01.2020</a:t>
+              <a:t>07.01.2020</a:t>
             </a:fld>
             <a:endParaRPr lang="pl-PL"/>
           </a:p>
@@ -4302,7 +4304,7 @@
           <a:p>
             <a:fld id="{8377D162-D88A-4FD6-BEEE-7A2BD5421321}" type="datetimeFigureOut">
               <a:rPr lang="pl-PL" smtClean="0"/>
-              <a:t>05.01.2020</a:t>
+              <a:t>07.01.2020</a:t>
             </a:fld>
             <a:endParaRPr lang="pl-PL"/>
           </a:p>
@@ -4565,7 +4567,7 @@
           <a:p>
             <a:fld id="{8377D162-D88A-4FD6-BEEE-7A2BD5421321}" type="datetimeFigureOut">
               <a:rPr lang="pl-PL" smtClean="0"/>
-              <a:t>05.01.2020</a:t>
+              <a:t>07.01.2020</a:t>
             </a:fld>
             <a:endParaRPr lang="pl-PL"/>
           </a:p>
@@ -5308,7 +5310,7 @@
           <a:p>
             <a:fld id="{8377D162-D88A-4FD6-BEEE-7A2BD5421321}" type="datetimeFigureOut">
               <a:rPr lang="pl-PL" smtClean="0"/>
-              <a:t>05.01.2020</a:t>
+              <a:t>07.01.2020</a:t>
             </a:fld>
             <a:endParaRPr lang="pl-PL"/>
           </a:p>
@@ -5845,10 +5847,10 @@
           <p:cNvPr id="8" name="Rectangle 7">
             <a:extLst>
               <a:ext uri="{FF2B5EF4-FFF2-40B4-BE49-F238E27FC236}">
-                <a16:creationId xmlns:a16="http://schemas.microsoft.com/office/drawing/2014/main" xmlns="" id="{9179DE42-5613-4B35-A1E6-6CCBAA13C743}"/>
+                <a16:creationId xmlns="" xmlns:a16="http://schemas.microsoft.com/office/drawing/2014/main" id="{9179DE42-5613-4B35-A1E6-6CCBAA13C743}"/>
               </a:ext>
               <a:ext uri="{C183D7F6-B498-43B3-948B-1728B52AA6E4}">
-                <adec:decorative xmlns:adec="http://schemas.microsoft.com/office/drawing/2017/decorative" xmlns="" val="1"/>
+                <adec:decorative xmlns="" xmlns:adec="http://schemas.microsoft.com/office/drawing/2017/decorative" val="1"/>
               </a:ext>
             </a:extLst>
           </p:cNvPr>
@@ -5858,7 +5860,7 @@
           <p:nvPr>
             <p:extLst>
               <p:ext uri="{386F3935-93C4-4BCD-93E2-E3B085C9AB24}">
-                <p16:designElem xmlns:p16="http://schemas.microsoft.com/office/powerpoint/2015/main" xmlns="" val="1"/>
+                <p16:designElem xmlns="" xmlns:p16="http://schemas.microsoft.com/office/powerpoint/2015/main" val="1"/>
               </p:ext>
             </p:extLst>
           </p:nvPr>
@@ -5905,10 +5907,10 @@
           <p:cNvPr id="10" name="Straight Connector 9">
             <a:extLst>
               <a:ext uri="{FF2B5EF4-FFF2-40B4-BE49-F238E27FC236}">
-                <a16:creationId xmlns:a16="http://schemas.microsoft.com/office/drawing/2014/main" xmlns="" id="{EB898B32-3891-4C3A-8F58-C5969D2E9033}"/>
+                <a16:creationId xmlns="" xmlns:a16="http://schemas.microsoft.com/office/drawing/2014/main" id="{EB898B32-3891-4C3A-8F58-C5969D2E9033}"/>
               </a:ext>
               <a:ext uri="{C183D7F6-B498-43B3-948B-1728B52AA6E4}">
-                <adec:decorative xmlns:adec="http://schemas.microsoft.com/office/drawing/2017/decorative" xmlns="" val="1"/>
+                <adec:decorative xmlns="" xmlns:adec="http://schemas.microsoft.com/office/drawing/2017/decorative" val="1"/>
               </a:ext>
             </a:extLst>
           </p:cNvPr>
@@ -5918,7 +5920,7 @@
           <p:nvPr>
             <p:extLst>
               <p:ext uri="{386F3935-93C4-4BCD-93E2-E3B085C9AB24}">
-                <p16:designElem xmlns:p16="http://schemas.microsoft.com/office/powerpoint/2015/main" xmlns="" val="1"/>
+                <p16:designElem xmlns="" xmlns:p16="http://schemas.microsoft.com/office/powerpoint/2015/main" val="1"/>
               </p:ext>
             </p:extLst>
           </p:nvPr>
@@ -5959,10 +5961,10 @@
           <p:cNvPr id="12" name="Straight Connector 11">
             <a:extLst>
               <a:ext uri="{FF2B5EF4-FFF2-40B4-BE49-F238E27FC236}">
-                <a16:creationId xmlns:a16="http://schemas.microsoft.com/office/drawing/2014/main" xmlns="" id="{4AE4806D-B8F9-4679-A68A-9BD21C01A301}"/>
+                <a16:creationId xmlns="" xmlns:a16="http://schemas.microsoft.com/office/drawing/2014/main" id="{4AE4806D-B8F9-4679-A68A-9BD21C01A301}"/>
               </a:ext>
               <a:ext uri="{C183D7F6-B498-43B3-948B-1728B52AA6E4}">
-                <adec:decorative xmlns:adec="http://schemas.microsoft.com/office/drawing/2017/decorative" xmlns="" val="1"/>
+                <adec:decorative xmlns="" xmlns:adec="http://schemas.microsoft.com/office/drawing/2017/decorative" val="1"/>
               </a:ext>
             </a:extLst>
           </p:cNvPr>
@@ -5972,7 +5974,7 @@
           <p:nvPr>
             <p:extLst>
               <p:ext uri="{386F3935-93C4-4BCD-93E2-E3B085C9AB24}">
-                <p16:designElem xmlns:p16="http://schemas.microsoft.com/office/powerpoint/2015/main" xmlns="" val="1"/>
+                <p16:designElem xmlns="" xmlns:p16="http://schemas.microsoft.com/office/powerpoint/2015/main" val="1"/>
               </p:ext>
             </p:extLst>
           </p:nvPr>
@@ -6015,10 +6017,10 @@
           <p:cNvPr id="14" name="Rectangle 23">
             <a:extLst>
               <a:ext uri="{FF2B5EF4-FFF2-40B4-BE49-F238E27FC236}">
-                <a16:creationId xmlns:a16="http://schemas.microsoft.com/office/drawing/2014/main" xmlns="" id="{52FB45E9-914E-4471-AC87-E475CD51767D}"/>
+                <a16:creationId xmlns="" xmlns:a16="http://schemas.microsoft.com/office/drawing/2014/main" id="{52FB45E9-914E-4471-AC87-E475CD51767D}"/>
               </a:ext>
               <a:ext uri="{C183D7F6-B498-43B3-948B-1728B52AA6E4}">
-                <adec:decorative xmlns:adec="http://schemas.microsoft.com/office/drawing/2017/decorative" xmlns="" val="1"/>
+                <adec:decorative xmlns="" xmlns:adec="http://schemas.microsoft.com/office/drawing/2017/decorative" val="1"/>
               </a:ext>
             </a:extLst>
           </p:cNvPr>
@@ -6028,7 +6030,7 @@
           <p:nvPr>
             <p:extLst>
               <p:ext uri="{386F3935-93C4-4BCD-93E2-E3B085C9AB24}">
-                <p16:designElem xmlns:p16="http://schemas.microsoft.com/office/powerpoint/2015/main" xmlns="" val="1"/>
+                <p16:designElem xmlns="" xmlns:p16="http://schemas.microsoft.com/office/powerpoint/2015/main" val="1"/>
               </p:ext>
             </p:extLst>
           </p:nvPr>
@@ -6095,10 +6097,10 @@
           <p:cNvPr id="16" name="Rectangle 25">
             <a:extLst>
               <a:ext uri="{FF2B5EF4-FFF2-40B4-BE49-F238E27FC236}">
-                <a16:creationId xmlns:a16="http://schemas.microsoft.com/office/drawing/2014/main" xmlns="" id="{C310626D-5743-49D4-8F7D-88C4F8F05774}"/>
+                <a16:creationId xmlns="" xmlns:a16="http://schemas.microsoft.com/office/drawing/2014/main" id="{C310626D-5743-49D4-8F7D-88C4F8F05774}"/>
               </a:ext>
               <a:ext uri="{C183D7F6-B498-43B3-948B-1728B52AA6E4}">
-                <adec:decorative xmlns:adec="http://schemas.microsoft.com/office/drawing/2017/decorative" xmlns="" val="1"/>
+                <adec:decorative xmlns="" xmlns:adec="http://schemas.microsoft.com/office/drawing/2017/decorative" val="1"/>
               </a:ext>
             </a:extLst>
           </p:cNvPr>
@@ -6108,7 +6110,7 @@
           <p:nvPr>
             <p:extLst>
               <p:ext uri="{386F3935-93C4-4BCD-93E2-E3B085C9AB24}">
-                <p16:designElem xmlns:p16="http://schemas.microsoft.com/office/powerpoint/2015/main" xmlns="" val="1"/>
+                <p16:designElem xmlns="" xmlns:p16="http://schemas.microsoft.com/office/powerpoint/2015/main" val="1"/>
               </p:ext>
             </p:extLst>
           </p:nvPr>
@@ -6175,10 +6177,10 @@
           <p:cNvPr id="18" name="Isosceles Triangle 17">
             <a:extLst>
               <a:ext uri="{FF2B5EF4-FFF2-40B4-BE49-F238E27FC236}">
-                <a16:creationId xmlns:a16="http://schemas.microsoft.com/office/drawing/2014/main" xmlns="" id="{3C195FC1-B568-4C72-9902-34CB35DDD7A1}"/>
+                <a16:creationId xmlns="" xmlns:a16="http://schemas.microsoft.com/office/drawing/2014/main" id="{3C195FC1-B568-4C72-9902-34CB35DDD7A1}"/>
               </a:ext>
               <a:ext uri="{C183D7F6-B498-43B3-948B-1728B52AA6E4}">
-                <adec:decorative xmlns:adec="http://schemas.microsoft.com/office/drawing/2017/decorative" xmlns="" val="1"/>
+                <adec:decorative xmlns="" xmlns:adec="http://schemas.microsoft.com/office/drawing/2017/decorative" val="1"/>
               </a:ext>
             </a:extLst>
           </p:cNvPr>
@@ -6188,7 +6190,7 @@
           <p:nvPr>
             <p:extLst>
               <p:ext uri="{386F3935-93C4-4BCD-93E2-E3B085C9AB24}">
-                <p16:designElem xmlns:p16="http://schemas.microsoft.com/office/powerpoint/2015/main" xmlns="" val="1"/>
+                <p16:designElem xmlns="" xmlns:p16="http://schemas.microsoft.com/office/powerpoint/2015/main" val="1"/>
               </p:ext>
             </p:extLst>
           </p:nvPr>
@@ -6233,10 +6235,10 @@
           <p:cNvPr id="20" name="Rectangle 27">
             <a:extLst>
               <a:ext uri="{FF2B5EF4-FFF2-40B4-BE49-F238E27FC236}">
-                <a16:creationId xmlns:a16="http://schemas.microsoft.com/office/drawing/2014/main" xmlns="" id="{EF2BDF77-362C-43F0-8CBB-A969EC2AE0C4}"/>
+                <a16:creationId xmlns="" xmlns:a16="http://schemas.microsoft.com/office/drawing/2014/main" id="{EF2BDF77-362C-43F0-8CBB-A969EC2AE0C4}"/>
               </a:ext>
               <a:ext uri="{C183D7F6-B498-43B3-948B-1728B52AA6E4}">
-                <adec:decorative xmlns:adec="http://schemas.microsoft.com/office/drawing/2017/decorative" xmlns="" val="1"/>
+                <adec:decorative xmlns="" xmlns:adec="http://schemas.microsoft.com/office/drawing/2017/decorative" val="1"/>
               </a:ext>
             </a:extLst>
           </p:cNvPr>
@@ -6246,7 +6248,7 @@
           <p:nvPr>
             <p:extLst>
               <p:ext uri="{386F3935-93C4-4BCD-93E2-E3B085C9AB24}">
-                <p16:designElem xmlns:p16="http://schemas.microsoft.com/office/powerpoint/2015/main" xmlns="" val="1"/>
+                <p16:designElem xmlns="" xmlns:p16="http://schemas.microsoft.com/office/powerpoint/2015/main" val="1"/>
               </p:ext>
             </p:extLst>
           </p:nvPr>
@@ -6314,10 +6316,10 @@
           <p:cNvPr id="22" name="Isosceles Triangle 21">
             <a:extLst>
               <a:ext uri="{FF2B5EF4-FFF2-40B4-BE49-F238E27FC236}">
-                <a16:creationId xmlns:a16="http://schemas.microsoft.com/office/drawing/2014/main" xmlns="" id="{4BE96B01-3929-432D-B8C2-ADBCB74C2EF4}"/>
+                <a16:creationId xmlns="" xmlns:a16="http://schemas.microsoft.com/office/drawing/2014/main" id="{4BE96B01-3929-432D-B8C2-ADBCB74C2EF4}"/>
               </a:ext>
               <a:ext uri="{C183D7F6-B498-43B3-948B-1728B52AA6E4}">
-                <adec:decorative xmlns:adec="http://schemas.microsoft.com/office/drawing/2017/decorative" xmlns="" val="1"/>
+                <adec:decorative xmlns="" xmlns:adec="http://schemas.microsoft.com/office/drawing/2017/decorative" val="1"/>
               </a:ext>
             </a:extLst>
           </p:cNvPr>
@@ -6327,7 +6329,7 @@
           <p:nvPr>
             <p:extLst>
               <p:ext uri="{386F3935-93C4-4BCD-93E2-E3B085C9AB24}">
-                <p16:designElem xmlns:p16="http://schemas.microsoft.com/office/powerpoint/2015/main" xmlns="" val="1"/>
+                <p16:designElem xmlns="" xmlns:p16="http://schemas.microsoft.com/office/powerpoint/2015/main" val="1"/>
               </p:ext>
             </p:extLst>
           </p:nvPr>
@@ -6372,10 +6374,10 @@
           <p:cNvPr id="24" name="Freeform: Shape 23">
             <a:extLst>
               <a:ext uri="{FF2B5EF4-FFF2-40B4-BE49-F238E27FC236}">
-                <a16:creationId xmlns:a16="http://schemas.microsoft.com/office/drawing/2014/main" xmlns="" id="{2A6FCDE6-CDE2-4C51-B18E-A95CFB679714}"/>
+                <a16:creationId xmlns="" xmlns:a16="http://schemas.microsoft.com/office/drawing/2014/main" id="{2A6FCDE6-CDE2-4C51-B18E-A95CFB679714}"/>
               </a:ext>
               <a:ext uri="{C183D7F6-B498-43B3-948B-1728B52AA6E4}">
-                <adec:decorative xmlns:adec="http://schemas.microsoft.com/office/drawing/2017/decorative" xmlns="" val="1"/>
+                <adec:decorative xmlns="" xmlns:adec="http://schemas.microsoft.com/office/drawing/2017/decorative" val="1"/>
               </a:ext>
             </a:extLst>
           </p:cNvPr>
@@ -6385,7 +6387,7 @@
           <p:nvPr>
             <p:extLst>
               <p:ext uri="{386F3935-93C4-4BCD-93E2-E3B085C9AB24}">
-                <p16:designElem xmlns:p16="http://schemas.microsoft.com/office/powerpoint/2015/main" xmlns="" val="1"/>
+                <p16:designElem xmlns="" xmlns:p16="http://schemas.microsoft.com/office/powerpoint/2015/main" val="1"/>
               </p:ext>
             </p:extLst>
           </p:nvPr>
@@ -6502,7 +6504,7 @@
           <p:cNvPr id="2" name="Title 1">
             <a:extLst>
               <a:ext uri="{FF2B5EF4-FFF2-40B4-BE49-F238E27FC236}">
-                <a16:creationId xmlns:a16="http://schemas.microsoft.com/office/drawing/2014/main" xmlns="" id="{348DC411-DC73-4AEB-A65D-54173A272F5A}"/>
+                <a16:creationId xmlns="" xmlns:a16="http://schemas.microsoft.com/office/drawing/2014/main" id="{348DC411-DC73-4AEB-A65D-54173A272F5A}"/>
               </a:ext>
             </a:extLst>
           </p:cNvPr>
@@ -6542,7 +6544,7 @@
           <p:cNvPr id="3" name="Subtitle 2">
             <a:extLst>
               <a:ext uri="{FF2B5EF4-FFF2-40B4-BE49-F238E27FC236}">
-                <a16:creationId xmlns:a16="http://schemas.microsoft.com/office/drawing/2014/main" xmlns="" id="{CC97934F-31A6-4589-B4C1-1E7E9FED0384}"/>
+                <a16:creationId xmlns="" xmlns:a16="http://schemas.microsoft.com/office/drawing/2014/main" id="{CC97934F-31A6-4589-B4C1-1E7E9FED0384}"/>
               </a:ext>
             </a:extLst>
           </p:cNvPr>
@@ -6627,10 +6629,10 @@
           <p:cNvPr id="26" name="Isosceles Triangle 25">
             <a:extLst>
               <a:ext uri="{FF2B5EF4-FFF2-40B4-BE49-F238E27FC236}">
-                <a16:creationId xmlns:a16="http://schemas.microsoft.com/office/drawing/2014/main" xmlns="" id="{9D2E8756-2465-473A-BA2A-2DB1D6224745}"/>
+                <a16:creationId xmlns="" xmlns:a16="http://schemas.microsoft.com/office/drawing/2014/main" id="{9D2E8756-2465-473A-BA2A-2DB1D6224745}"/>
               </a:ext>
               <a:ext uri="{C183D7F6-B498-43B3-948B-1728B52AA6E4}">
-                <adec:decorative xmlns:adec="http://schemas.microsoft.com/office/drawing/2017/decorative" xmlns="" val="1"/>
+                <adec:decorative xmlns="" xmlns:adec="http://schemas.microsoft.com/office/drawing/2017/decorative" val="1"/>
               </a:ext>
             </a:extLst>
           </p:cNvPr>
@@ -6640,7 +6642,7 @@
           <p:nvPr>
             <p:extLst>
               <p:ext uri="{386F3935-93C4-4BCD-93E2-E3B085C9AB24}">
-                <p16:designElem xmlns:p16="http://schemas.microsoft.com/office/powerpoint/2015/main" xmlns="" val="1"/>
+                <p16:designElem xmlns="" xmlns:p16="http://schemas.microsoft.com/office/powerpoint/2015/main" val="1"/>
               </p:ext>
             </p:extLst>
           </p:nvPr>
@@ -6695,6 +6697,13 @@
   <p:clrMapOvr>
     <a:overrideClrMapping bg1="dk1" tx1="lt1" bg2="dk2" tx2="lt2" accent1="accent1" accent2="accent2" accent3="accent3" accent4="accent4" accent5="accent5" accent6="accent6" hlink="hlink" folHlink="folHlink"/>
   </p:clrMapOvr>
+  <p:timing>
+    <p:tnLst>
+      <p:par>
+        <p:cTn id="1" dur="indefinite" restart="never" nodeType="tmRoot"/>
+      </p:par>
+    </p:tnLst>
+  </p:timing>
 </p:sld>
 </file>
 
@@ -6903,6 +6912,13 @@
   <p:clrMapOvr>
     <a:masterClrMapping/>
   </p:clrMapOvr>
+  <p:timing>
+    <p:tnLst>
+      <p:par>
+        <p:cTn id="1" dur="indefinite" restart="never" nodeType="tmRoot"/>
+      </p:par>
+    </p:tnLst>
+  </p:timing>
 </p:sld>
 </file>
 
@@ -7046,6 +7062,13 @@
   <p:clrMapOvr>
     <a:masterClrMapping/>
   </p:clrMapOvr>
+  <p:timing>
+    <p:tnLst>
+      <p:par>
+        <p:cTn id="1" dur="indefinite" restart="never" nodeType="tmRoot"/>
+      </p:par>
+    </p:tnLst>
+  </p:timing>
 </p:sld>
 </file>
 
@@ -7083,6 +7106,226 @@
           <a:p>
             <a:r>
               <a:rPr lang="pl-PL" dirty="0" err="1" smtClean="0"/>
+              <a:t>Functionality</a:t>
+            </a:r>
+            <a:endParaRPr lang="pl-PL" dirty="0"/>
+          </a:p>
+        </p:txBody>
+      </p:sp>
+      <p:sp>
+        <p:nvSpPr>
+          <p:cNvPr id="3" name="Symbol zastępczy zawartości 2"/>
+          <p:cNvSpPr>
+            <a:spLocks noGrp="1"/>
+          </p:cNvSpPr>
+          <p:nvPr>
+            <p:ph idx="1"/>
+          </p:nvPr>
+        </p:nvSpPr>
+        <p:spPr/>
+        <p:txBody>
+          <a:bodyPr/>
+          <a:lstStyle/>
+          <a:p>
+            <a:r>
+              <a:rPr lang="pl-PL" dirty="0" smtClean="0"/>
+              <a:t>Monitoring environment and </a:t>
+            </a:r>
+            <a:r>
+              <a:rPr lang="pl-PL" dirty="0" err="1" smtClean="0"/>
+              <a:t>soil</a:t>
+            </a:r>
+            <a:r>
+              <a:rPr lang="pl-PL" dirty="0" smtClean="0"/>
+              <a:t> </a:t>
+            </a:r>
+            <a:r>
+              <a:rPr lang="pl-PL" dirty="0" err="1" smtClean="0"/>
+              <a:t>parameters</a:t>
+            </a:r>
+            <a:r>
+              <a:rPr lang="pl-PL" dirty="0" smtClean="0"/>
+              <a:t> (</a:t>
+            </a:r>
+            <a:r>
+              <a:rPr lang="pl-PL" dirty="0" err="1" smtClean="0"/>
+              <a:t>Humidity</a:t>
+            </a:r>
+            <a:r>
+              <a:rPr lang="pl-PL" dirty="0" smtClean="0"/>
+              <a:t>, </a:t>
+            </a:r>
+            <a:r>
+              <a:rPr lang="pl-PL" dirty="0" err="1" smtClean="0"/>
+              <a:t>moisture</a:t>
+            </a:r>
+            <a:r>
+              <a:rPr lang="pl-PL" dirty="0" smtClean="0"/>
+              <a:t>, </a:t>
+            </a:r>
+            <a:r>
+              <a:rPr lang="pl-PL" dirty="0" err="1" smtClean="0"/>
+              <a:t>temperature</a:t>
+            </a:r>
+            <a:r>
+              <a:rPr lang="pl-PL" dirty="0" smtClean="0"/>
+              <a:t>, </a:t>
+            </a:r>
+            <a:r>
+              <a:rPr lang="pl-PL" dirty="0" err="1"/>
+              <a:t>b</a:t>
+            </a:r>
+            <a:r>
+              <a:rPr lang="pl-PL" dirty="0" err="1" smtClean="0"/>
+              <a:t>rightness</a:t>
+            </a:r>
+            <a:r>
+              <a:rPr lang="pl-PL" dirty="0" smtClean="0"/>
+              <a:t>)</a:t>
+            </a:r>
+          </a:p>
+          <a:p>
+            <a:r>
+              <a:rPr lang="pl-PL" dirty="0" err="1" smtClean="0"/>
+              <a:t>Sending</a:t>
+            </a:r>
+            <a:r>
+              <a:rPr lang="pl-PL" dirty="0" smtClean="0"/>
+              <a:t> </a:t>
+            </a:r>
+            <a:r>
+              <a:rPr lang="pl-PL" dirty="0" err="1" smtClean="0"/>
+              <a:t>commands</a:t>
+            </a:r>
+            <a:r>
+              <a:rPr lang="pl-PL" dirty="0" smtClean="0"/>
+              <a:t> to </a:t>
+            </a:r>
+            <a:r>
+              <a:rPr lang="pl-PL" dirty="0" err="1" smtClean="0"/>
+              <a:t>arduino</a:t>
+            </a:r>
+            <a:r>
+              <a:rPr lang="pl-PL" dirty="0" smtClean="0"/>
+              <a:t> (</a:t>
+            </a:r>
+            <a:r>
+              <a:rPr lang="pl-PL" dirty="0" err="1" smtClean="0"/>
+              <a:t>eg</a:t>
+            </a:r>
+            <a:r>
+              <a:rPr lang="pl-PL" dirty="0" smtClean="0"/>
+              <a:t>. </a:t>
+            </a:r>
+            <a:r>
+              <a:rPr lang="pl-PL" dirty="0" err="1" smtClean="0"/>
+              <a:t>watering</a:t>
+            </a:r>
+            <a:r>
+              <a:rPr lang="pl-PL" dirty="0" smtClean="0"/>
+              <a:t> plant)</a:t>
+            </a:r>
+          </a:p>
+          <a:p>
+            <a:r>
+              <a:rPr lang="pl-PL" dirty="0" err="1" smtClean="0"/>
+              <a:t>Saving</a:t>
+            </a:r>
+            <a:r>
+              <a:rPr lang="pl-PL" dirty="0" smtClean="0"/>
+              <a:t> data to </a:t>
+            </a:r>
+            <a:r>
+              <a:rPr lang="pl-PL" dirty="0" err="1" smtClean="0"/>
+              <a:t>database</a:t>
+            </a:r>
+            <a:endParaRPr lang="pl-PL" dirty="0" smtClean="0"/>
+          </a:p>
+          <a:p>
+            <a:r>
+              <a:rPr lang="pl-PL" dirty="0" smtClean="0"/>
+              <a:t>Data </a:t>
+            </a:r>
+            <a:r>
+              <a:rPr lang="pl-PL" dirty="0" err="1" smtClean="0"/>
+              <a:t>visualisation</a:t>
+            </a:r>
+            <a:r>
+              <a:rPr lang="pl-PL" dirty="0" smtClean="0"/>
+              <a:t>(chart)</a:t>
+            </a:r>
+          </a:p>
+          <a:p>
+            <a:r>
+              <a:rPr lang="pl-PL" dirty="0" err="1" smtClean="0"/>
+              <a:t>Possibility</a:t>
+            </a:r>
+            <a:r>
+              <a:rPr lang="pl-PL" dirty="0" smtClean="0"/>
+              <a:t> of </a:t>
+            </a:r>
+            <a:r>
+              <a:rPr lang="pl-PL" dirty="0" err="1" smtClean="0"/>
+              <a:t>watering</a:t>
+            </a:r>
+            <a:endParaRPr lang="pl-PL" dirty="0"/>
+          </a:p>
+        </p:txBody>
+      </p:sp>
+    </p:spTree>
+    <p:extLst>
+      <p:ext uri="{BB962C8B-B14F-4D97-AF65-F5344CB8AC3E}">
+        <p14:creationId xmlns:p14="http://schemas.microsoft.com/office/powerpoint/2010/main" val="99952811"/>
+      </p:ext>
+    </p:extLst>
+  </p:cSld>
+  <p:clrMapOvr>
+    <a:masterClrMapping/>
+  </p:clrMapOvr>
+  <p:timing>
+    <p:tnLst>
+      <p:par>
+        <p:cTn id="1" dur="indefinite" restart="never" nodeType="tmRoot"/>
+      </p:par>
+    </p:tnLst>
+  </p:timing>
+</p:sld>
+</file>
+
+<file path=ppt/slides/slide5.xml><?xml version="1.0" encoding="utf-8"?>
+<p:sld xmlns:a="http://schemas.openxmlformats.org/drawingml/2006/main" xmlns:r="http://schemas.openxmlformats.org/officeDocument/2006/relationships" xmlns:p="http://schemas.openxmlformats.org/presentationml/2006/main">
+  <p:cSld>
+    <p:spTree>
+      <p:nvGrpSpPr>
+        <p:cNvPr id="1" name=""/>
+        <p:cNvGrpSpPr/>
+        <p:nvPr/>
+      </p:nvGrpSpPr>
+      <p:grpSpPr>
+        <a:xfrm>
+          <a:off x="0" y="0"/>
+          <a:ext cx="0" cy="0"/>
+          <a:chOff x="0" y="0"/>
+          <a:chExt cx="0" cy="0"/>
+        </a:xfrm>
+      </p:grpSpPr>
+      <p:sp>
+        <p:nvSpPr>
+          <p:cNvPr id="2" name="Tytuł 1"/>
+          <p:cNvSpPr>
+            <a:spLocks noGrp="1"/>
+          </p:cNvSpPr>
+          <p:nvPr>
+            <p:ph type="title"/>
+          </p:nvPr>
+        </p:nvSpPr>
+        <p:spPr/>
+        <p:txBody>
+          <a:bodyPr/>
+          <a:lstStyle/>
+          <a:p>
+            <a:r>
+              <a:rPr lang="pl-PL" dirty="0" err="1" smtClean="0"/>
               <a:t>Work</a:t>
             </a:r>
             <a:r>
@@ -7126,6 +7369,103 @@
   <p:clrMapOvr>
     <a:masterClrMapping/>
   </p:clrMapOvr>
+  <p:timing>
+    <p:tnLst>
+      <p:par>
+        <p:cTn id="1" dur="indefinite" restart="never" nodeType="tmRoot"/>
+      </p:par>
+    </p:tnLst>
+  </p:timing>
+</p:sld>
+</file>
+
+<file path=ppt/slides/slide6.xml><?xml version="1.0" encoding="utf-8"?>
+<p:sld xmlns:a="http://schemas.openxmlformats.org/drawingml/2006/main" xmlns:r="http://schemas.openxmlformats.org/officeDocument/2006/relationships" xmlns:p="http://schemas.openxmlformats.org/presentationml/2006/main">
+  <p:cSld>
+    <p:spTree>
+      <p:nvGrpSpPr>
+        <p:cNvPr id="1" name=""/>
+        <p:cNvGrpSpPr/>
+        <p:nvPr/>
+      </p:nvGrpSpPr>
+      <p:grpSpPr>
+        <a:xfrm>
+          <a:off x="0" y="0"/>
+          <a:ext cx="0" cy="0"/>
+          <a:chOff x="0" y="0"/>
+          <a:chExt cx="0" cy="0"/>
+        </a:xfrm>
+      </p:grpSpPr>
+      <p:sp>
+        <p:nvSpPr>
+          <p:cNvPr id="2" name="Tytuł 1"/>
+          <p:cNvSpPr>
+            <a:spLocks noGrp="1"/>
+          </p:cNvSpPr>
+          <p:nvPr>
+            <p:ph type="title"/>
+          </p:nvPr>
+        </p:nvSpPr>
+        <p:spPr/>
+        <p:txBody>
+          <a:bodyPr/>
+          <a:lstStyle/>
+          <a:p>
+            <a:r>
+              <a:rPr lang="pl-PL" dirty="0" err="1" smtClean="0"/>
+              <a:t>Thanks</a:t>
+            </a:r>
+            <a:r>
+              <a:rPr lang="pl-PL" dirty="0" smtClean="0"/>
+              <a:t> for </a:t>
+            </a:r>
+            <a:r>
+              <a:rPr lang="pl-PL" dirty="0" err="1" smtClean="0"/>
+              <a:t>attention</a:t>
+            </a:r>
+            <a:endParaRPr lang="pl-PL" dirty="0"/>
+          </a:p>
+        </p:txBody>
+      </p:sp>
+      <p:sp>
+        <p:nvSpPr>
+          <p:cNvPr id="3" name="Symbol zastępczy zawartości 2"/>
+          <p:cNvSpPr>
+            <a:spLocks noGrp="1"/>
+          </p:cNvSpPr>
+          <p:nvPr>
+            <p:ph idx="1"/>
+          </p:nvPr>
+        </p:nvSpPr>
+        <p:spPr/>
+        <p:txBody>
+          <a:bodyPr/>
+          <a:lstStyle/>
+          <a:p>
+            <a:pPr marL="0" indent="0">
+              <a:buNone/>
+            </a:pPr>
+            <a:endParaRPr lang="pl-PL" dirty="0"/>
+          </a:p>
+        </p:txBody>
+      </p:sp>
+    </p:spTree>
+    <p:extLst>
+      <p:ext uri="{BB962C8B-B14F-4D97-AF65-F5344CB8AC3E}">
+        <p14:creationId xmlns:p14="http://schemas.microsoft.com/office/powerpoint/2010/main" val="974547289"/>
+      </p:ext>
+    </p:extLst>
+  </p:cSld>
+  <p:clrMapOvr>
+    <a:masterClrMapping/>
+  </p:clrMapOvr>
+  <p:timing>
+    <p:tnLst>
+      <p:par>
+        <p:cTn id="1" dur="indefinite" restart="never" nodeType="tmRoot"/>
+      </p:par>
+    </p:tnLst>
+  </p:timing>
 </p:sld>
 </file>
 
@@ -7380,7 +7720,7 @@
   <a:extraClrSchemeLst/>
   <a:extLst>
     <a:ext uri="{05A4C25C-085E-4340-85A3-A5531E510DB2}">
-      <thm15:themeFamily xmlns:thm15="http://schemas.microsoft.com/office/thememl/2012/main" xmlns="" name="Facet" id="{C0C680CD-088A-49FC-A102-D699147F32B2}" vid="{CFBC31BA-B70F-4F30-BCAA-4F3011E16C4D}"/>
+      <thm15:themeFamily xmlns="" xmlns:thm15="http://schemas.microsoft.com/office/thememl/2012/main" name="Facet" id="{C0C680CD-088A-49FC-A102-D699147F32B2}" vid="{CFBC31BA-B70F-4F30-BCAA-4F3011E16C4D}"/>
     </a:ext>
   </a:extLst>
 </a:theme>

</xml_diff>

<commit_message>
IT Raport update, presentation update
</commit_message>
<xml_diff>
--- a/text/it/Plantie™.pptx
+++ b/text/it/Plantie™.pptx
@@ -839,7 +839,7 @@
           <a:p>
             <a:fld id="{8377D162-D88A-4FD6-BEEE-7A2BD5421321}" type="datetimeFigureOut">
               <a:rPr lang="pl-PL" smtClean="0"/>
-              <a:t>07.01.2020</a:t>
+              <a:t>08.01.2020</a:t>
             </a:fld>
             <a:endParaRPr lang="pl-PL"/>
           </a:p>
@@ -1090,7 +1090,7 @@
           <a:p>
             <a:fld id="{8377D162-D88A-4FD6-BEEE-7A2BD5421321}" type="datetimeFigureOut">
               <a:rPr lang="pl-PL" smtClean="0"/>
-              <a:t>07.01.2020</a:t>
+              <a:t>08.01.2020</a:t>
             </a:fld>
             <a:endParaRPr lang="pl-PL"/>
           </a:p>
@@ -1404,7 +1404,7 @@
           <a:p>
             <a:fld id="{8377D162-D88A-4FD6-BEEE-7A2BD5421321}" type="datetimeFigureOut">
               <a:rPr lang="pl-PL" smtClean="0"/>
-              <a:t>07.01.2020</a:t>
+              <a:t>08.01.2020</a:t>
             </a:fld>
             <a:endParaRPr lang="pl-PL"/>
           </a:p>
@@ -1745,7 +1745,7 @@
           <a:p>
             <a:fld id="{8377D162-D88A-4FD6-BEEE-7A2BD5421321}" type="datetimeFigureOut">
               <a:rPr lang="pl-PL" smtClean="0"/>
-              <a:t>07.01.2020</a:t>
+              <a:t>08.01.2020</a:t>
             </a:fld>
             <a:endParaRPr lang="pl-PL"/>
           </a:p>
@@ -2059,7 +2059,7 @@
           <a:p>
             <a:fld id="{8377D162-D88A-4FD6-BEEE-7A2BD5421321}" type="datetimeFigureOut">
               <a:rPr lang="pl-PL" smtClean="0"/>
-              <a:t>07.01.2020</a:t>
+              <a:t>08.01.2020</a:t>
             </a:fld>
             <a:endParaRPr lang="pl-PL"/>
           </a:p>
@@ -2452,7 +2452,7 @@
           <a:p>
             <a:fld id="{8377D162-D88A-4FD6-BEEE-7A2BD5421321}" type="datetimeFigureOut">
               <a:rPr lang="pl-PL" smtClean="0"/>
-              <a:t>07.01.2020</a:t>
+              <a:t>08.01.2020</a:t>
             </a:fld>
             <a:endParaRPr lang="pl-PL"/>
           </a:p>
@@ -2622,7 +2622,7 @@
           <a:p>
             <a:fld id="{8377D162-D88A-4FD6-BEEE-7A2BD5421321}" type="datetimeFigureOut">
               <a:rPr lang="pl-PL" smtClean="0"/>
-              <a:t>07.01.2020</a:t>
+              <a:t>08.01.2020</a:t>
             </a:fld>
             <a:endParaRPr lang="pl-PL"/>
           </a:p>
@@ -2802,7 +2802,7 @@
           <a:p>
             <a:fld id="{8377D162-D88A-4FD6-BEEE-7A2BD5421321}" type="datetimeFigureOut">
               <a:rPr lang="pl-PL" smtClean="0"/>
-              <a:t>07.01.2020</a:t>
+              <a:t>08.01.2020</a:t>
             </a:fld>
             <a:endParaRPr lang="pl-PL"/>
           </a:p>
@@ -2978,7 +2978,7 @@
           <a:p>
             <a:fld id="{8377D162-D88A-4FD6-BEEE-7A2BD5421321}" type="datetimeFigureOut">
               <a:rPr lang="pl-PL" smtClean="0"/>
-              <a:t>07.01.2020</a:t>
+              <a:t>08.01.2020</a:t>
             </a:fld>
             <a:endParaRPr lang="pl-PL"/>
           </a:p>
@@ -3225,7 +3225,7 @@
           <a:p>
             <a:fld id="{8377D162-D88A-4FD6-BEEE-7A2BD5421321}" type="datetimeFigureOut">
               <a:rPr lang="pl-PL" smtClean="0"/>
-              <a:t>07.01.2020</a:t>
+              <a:t>08.01.2020</a:t>
             </a:fld>
             <a:endParaRPr lang="pl-PL"/>
           </a:p>
@@ -3457,7 +3457,7 @@
           <a:p>
             <a:fld id="{8377D162-D88A-4FD6-BEEE-7A2BD5421321}" type="datetimeFigureOut">
               <a:rPr lang="pl-PL" smtClean="0"/>
-              <a:t>07.01.2020</a:t>
+              <a:t>08.01.2020</a:t>
             </a:fld>
             <a:endParaRPr lang="pl-PL"/>
           </a:p>
@@ -3831,7 +3831,7 @@
           <a:p>
             <a:fld id="{8377D162-D88A-4FD6-BEEE-7A2BD5421321}" type="datetimeFigureOut">
               <a:rPr lang="pl-PL" smtClean="0"/>
-              <a:t>07.01.2020</a:t>
+              <a:t>08.01.2020</a:t>
             </a:fld>
             <a:endParaRPr lang="pl-PL"/>
           </a:p>
@@ -3954,7 +3954,7 @@
           <a:p>
             <a:fld id="{8377D162-D88A-4FD6-BEEE-7A2BD5421321}" type="datetimeFigureOut">
               <a:rPr lang="pl-PL" smtClean="0"/>
-              <a:t>07.01.2020</a:t>
+              <a:t>08.01.2020</a:t>
             </a:fld>
             <a:endParaRPr lang="pl-PL"/>
           </a:p>
@@ -4049,7 +4049,7 @@
           <a:p>
             <a:fld id="{8377D162-D88A-4FD6-BEEE-7A2BD5421321}" type="datetimeFigureOut">
               <a:rPr lang="pl-PL" smtClean="0"/>
-              <a:t>07.01.2020</a:t>
+              <a:t>08.01.2020</a:t>
             </a:fld>
             <a:endParaRPr lang="pl-PL"/>
           </a:p>
@@ -4304,7 +4304,7 @@
           <a:p>
             <a:fld id="{8377D162-D88A-4FD6-BEEE-7A2BD5421321}" type="datetimeFigureOut">
               <a:rPr lang="pl-PL" smtClean="0"/>
-              <a:t>07.01.2020</a:t>
+              <a:t>08.01.2020</a:t>
             </a:fld>
             <a:endParaRPr lang="pl-PL"/>
           </a:p>
@@ -4567,7 +4567,7 @@
           <a:p>
             <a:fld id="{8377D162-D88A-4FD6-BEEE-7A2BD5421321}" type="datetimeFigureOut">
               <a:rPr lang="pl-PL" smtClean="0"/>
-              <a:t>07.01.2020</a:t>
+              <a:t>08.01.2020</a:t>
             </a:fld>
             <a:endParaRPr lang="pl-PL"/>
           </a:p>
@@ -5310,7 +5310,7 @@
           <a:p>
             <a:fld id="{8377D162-D88A-4FD6-BEEE-7A2BD5421321}" type="datetimeFigureOut">
               <a:rPr lang="pl-PL" smtClean="0"/>
-              <a:t>07.01.2020</a:t>
+              <a:t>08.01.2020</a:t>
             </a:fld>
             <a:endParaRPr lang="pl-PL"/>
           </a:p>
@@ -7018,6 +7018,13 @@
           </a:p>
           <a:p>
             <a:r>
+              <a:rPr lang="pl-PL" sz="2000" dirty="0" err="1" smtClean="0"/>
+              <a:t>Axios</a:t>
+            </a:r>
+            <a:endParaRPr lang="pl-PL" sz="2000" dirty="0" smtClean="0"/>
+          </a:p>
+          <a:p>
+            <a:r>
               <a:rPr lang="pl-PL" sz="2000" dirty="0"/>
               <a:t>Font </a:t>
             </a:r>
@@ -7043,12 +7050,6 @@
               <a:rPr lang="pl-PL" sz="2000" dirty="0" smtClean="0"/>
               <a:t> IDE</a:t>
             </a:r>
-          </a:p>
-          <a:p>
-            <a:pPr marL="0" indent="0">
-              <a:buNone/>
-            </a:pPr>
-            <a:endParaRPr lang="pl-PL" dirty="0"/>
           </a:p>
         </p:txBody>
       </p:sp>
@@ -7258,16 +7259,27 @@
           <a:p>
             <a:r>
               <a:rPr lang="pl-PL" dirty="0" err="1" smtClean="0"/>
-              <a:t>Possibility</a:t>
+              <a:t>Easily</a:t>
             </a:r>
             <a:r>
               <a:rPr lang="pl-PL" dirty="0" smtClean="0"/>
-              <a:t> of </a:t>
+              <a:t> </a:t>
             </a:r>
             <a:r>
               <a:rPr lang="pl-PL" dirty="0" err="1" smtClean="0"/>
-              <a:t>watering</a:t>
-            </a:r>
+              <a:t>possible</a:t>
+            </a:r>
+            <a:r>
+              <a:rPr lang="pl-PL" dirty="0" smtClean="0"/>
+              <a:t> </a:t>
+            </a:r>
+            <a:r>
+              <a:rPr lang="pl-PL" dirty="0" err="1" smtClean="0"/>
+              <a:t>improvements</a:t>
+            </a:r>
+            <a:endParaRPr lang="pl-PL" dirty="0" smtClean="0"/>
+          </a:p>
+          <a:p>
             <a:endParaRPr lang="pl-PL" dirty="0"/>
           </a:p>
         </p:txBody>

</xml_diff>